<commit_message>
add end-to-end service picture
</commit_message>
<xml_diff>
--- a/LTE_introduction_by_zhoulei.pptx
+++ b/LTE_introduction_by_zhoulei.pptx
@@ -7,10 +7,10 @@
     <p:sldMasterId id="2147483812" r:id="rId3"/>
   </p:sldMasterIdLst>
   <p:notesMasterIdLst>
-    <p:notesMasterId r:id="rId23"/>
+    <p:notesMasterId r:id="rId24"/>
   </p:notesMasterIdLst>
   <p:handoutMasterIdLst>
-    <p:handoutMasterId r:id="rId24"/>
+    <p:handoutMasterId r:id="rId25"/>
   </p:handoutMasterIdLst>
   <p:sldIdLst>
     <p:sldId id="311" r:id="rId4"/>
@@ -25,13 +25,14 @@
     <p:sldId id="377" r:id="rId13"/>
     <p:sldId id="378" r:id="rId14"/>
     <p:sldId id="379" r:id="rId15"/>
-    <p:sldId id="380" r:id="rId16"/>
-    <p:sldId id="381" r:id="rId17"/>
-    <p:sldId id="382" r:id="rId18"/>
-    <p:sldId id="363" r:id="rId19"/>
-    <p:sldId id="366" r:id="rId20"/>
-    <p:sldId id="352" r:id="rId21"/>
-    <p:sldId id="358" r:id="rId22"/>
+    <p:sldId id="383" r:id="rId16"/>
+    <p:sldId id="380" r:id="rId17"/>
+    <p:sldId id="381" r:id="rId18"/>
+    <p:sldId id="382" r:id="rId19"/>
+    <p:sldId id="363" r:id="rId20"/>
+    <p:sldId id="366" r:id="rId21"/>
+    <p:sldId id="352" r:id="rId22"/>
+    <p:sldId id="358" r:id="rId23"/>
   </p:sldIdLst>
   <p:sldSz cx="9144000" cy="5143500" type="screen16x9"/>
   <p:notesSz cx="6810375" cy="9942513"/>
@@ -162,7 +163,7 @@
   </p:defaultTextStyle>
   <p:extLst>
     <p:ext uri="{EFAFB233-063F-42B5-8137-9DF3F51BA10A}">
-      <p15:sldGuideLst xmlns:p15="http://schemas.microsoft.com/office/powerpoint/2012/main" xmlns="">
+      <p15:sldGuideLst xmlns="" xmlns:p15="http://schemas.microsoft.com/office/powerpoint/2012/main">
         <p15:guide id="1" orient="horz" pos="1620">
           <p15:clr>
             <a:srgbClr val="A4A3A4"/>
@@ -176,7 +177,7 @@
       </p15:sldGuideLst>
     </p:ext>
     <p:ext uri="{2D200454-40CA-4A62-9FC3-DE9A4176ACB9}">
-      <p15:notesGuideLst xmlns:p15="http://schemas.microsoft.com/office/powerpoint/2012/main" xmlns="">
+      <p15:notesGuideLst xmlns="" xmlns:p15="http://schemas.microsoft.com/office/powerpoint/2012/main">
         <p15:guide id="1" orient="horz" pos="2880">
           <p15:clr>
             <a:srgbClr val="A4A3A4"/>
@@ -418,7 +419,7 @@
     </p:spTree>
     <p:extLst>
       <p:ext uri="{BB962C8B-B14F-4D97-AF65-F5344CB8AC3E}">
-        <p14:creationId xmlns:p14="http://schemas.microsoft.com/office/powerpoint/2010/main" xmlns="" val="3867598621"/>
+        <p14:creationId xmlns="" xmlns:p14="http://schemas.microsoft.com/office/powerpoint/2010/main" val="3867598621"/>
       </p:ext>
     </p:extLst>
   </p:cSld>
@@ -739,7 +740,7 @@
     </p:spTree>
     <p:extLst>
       <p:ext uri="{BB962C8B-B14F-4D97-AF65-F5344CB8AC3E}">
-        <p14:creationId xmlns:p14="http://schemas.microsoft.com/office/powerpoint/2010/main" xmlns="" val="977992471"/>
+        <p14:creationId xmlns="" xmlns:p14="http://schemas.microsoft.com/office/powerpoint/2010/main" val="977992471"/>
       </p:ext>
     </p:extLst>
   </p:cSld>
@@ -965,7 +966,7 @@
     </p:spTree>
     <p:extLst>
       <p:ext uri="{BB962C8B-B14F-4D97-AF65-F5344CB8AC3E}">
-        <p14:creationId xmlns:p14="http://schemas.microsoft.com/office/powerpoint/2010/main" xmlns="" val="3180054805"/>
+        <p14:creationId xmlns="" xmlns:p14="http://schemas.microsoft.com/office/powerpoint/2010/main" val="3180054805"/>
       </p:ext>
     </p:extLst>
   </p:cSld>
@@ -1057,7 +1058,7 @@
     </p:spTree>
     <p:extLst>
       <p:ext uri="{BB962C8B-B14F-4D97-AF65-F5344CB8AC3E}">
-        <p14:creationId xmlns:p14="http://schemas.microsoft.com/office/powerpoint/2010/main" xmlns="" val="2320194548"/>
+        <p14:creationId xmlns="" xmlns:p14="http://schemas.microsoft.com/office/powerpoint/2010/main" val="2320194548"/>
       </p:ext>
     </p:extLst>
   </p:cSld>
@@ -1149,7 +1150,7 @@
     </p:spTree>
     <p:extLst>
       <p:ext uri="{BB962C8B-B14F-4D97-AF65-F5344CB8AC3E}">
-        <p14:creationId xmlns:p14="http://schemas.microsoft.com/office/powerpoint/2010/main" xmlns="" val="2537211958"/>
+        <p14:creationId xmlns="" xmlns:p14="http://schemas.microsoft.com/office/powerpoint/2010/main" val="2537211958"/>
       </p:ext>
     </p:extLst>
   </p:cSld>
@@ -1241,7 +1242,7 @@
     </p:spTree>
     <p:extLst>
       <p:ext uri="{BB962C8B-B14F-4D97-AF65-F5344CB8AC3E}">
-        <p14:creationId xmlns:p14="http://schemas.microsoft.com/office/powerpoint/2010/main" xmlns="" val="2537211958"/>
+        <p14:creationId xmlns="" xmlns:p14="http://schemas.microsoft.com/office/powerpoint/2010/main" val="2537211958"/>
       </p:ext>
     </p:extLst>
   </p:cSld>
@@ -1333,7 +1334,7 @@
     </p:spTree>
     <p:extLst>
       <p:ext uri="{BB962C8B-B14F-4D97-AF65-F5344CB8AC3E}">
-        <p14:creationId xmlns:p14="http://schemas.microsoft.com/office/powerpoint/2010/main" xmlns="" val="2537211958"/>
+        <p14:creationId xmlns="" xmlns:p14="http://schemas.microsoft.com/office/powerpoint/2010/main" val="2537211958"/>
       </p:ext>
     </p:extLst>
   </p:cSld>
@@ -1425,7 +1426,7 @@
     </p:spTree>
     <p:extLst>
       <p:ext uri="{BB962C8B-B14F-4D97-AF65-F5344CB8AC3E}">
-        <p14:creationId xmlns:p14="http://schemas.microsoft.com/office/powerpoint/2010/main" xmlns="" val="2537211958"/>
+        <p14:creationId xmlns="" xmlns:p14="http://schemas.microsoft.com/office/powerpoint/2010/main" val="2537211958"/>
       </p:ext>
     </p:extLst>
   </p:cSld>
@@ -1481,50 +1482,7 @@
           </a:bodyPr>
           <a:lstStyle/>
           <a:p>
-            <a:r>
-              <a:rPr lang="en-US" altLang="zh-CN" dirty="0"/>
-              <a:t>LTE</a:t>
-            </a:r>
-            <a:r>
-              <a:rPr lang="zh-CN" altLang="en-US" dirty="0"/>
-              <a:t>系统只是一个通俗的说法</a:t>
-            </a:r>
-            <a:r>
-              <a:rPr lang="en-US" altLang="zh-CN" dirty="0"/>
-              <a:t>,</a:t>
-            </a:r>
-            <a:r>
-              <a:rPr lang="zh-CN" altLang="en-US" dirty="0"/>
-              <a:t>实际上规范的称法是</a:t>
-            </a:r>
-            <a:r>
-              <a:rPr lang="en-US" altLang="zh-CN" dirty="0"/>
-              <a:t>EPS,</a:t>
-            </a:r>
-            <a:r>
-              <a:rPr lang="zh-CN" altLang="en-US" baseline="0" dirty="0"/>
-              <a:t>它由</a:t>
-            </a:r>
-            <a:r>
-              <a:rPr lang="en-US" altLang="zh-CN" baseline="0" dirty="0"/>
-              <a:t>EPC</a:t>
-            </a:r>
-            <a:r>
-              <a:rPr lang="zh-CN" altLang="en-US" baseline="0" dirty="0"/>
-              <a:t>和</a:t>
-            </a:r>
-            <a:r>
-              <a:rPr lang="en-US" altLang="zh-CN" baseline="0" dirty="0"/>
-              <a:t>E-UTRAN</a:t>
-            </a:r>
-            <a:r>
-              <a:rPr lang="zh-CN" altLang="en-US" baseline="0" dirty="0"/>
-              <a:t>组成</a:t>
-            </a:r>
-            <a:r>
-              <a:rPr lang="en-US" altLang="zh-CN" baseline="0" dirty="0"/>
-              <a:t>.</a:t>
-            </a:r>
+            <a:endParaRPr lang="en-US" altLang="zh-CN" baseline="0" dirty="0"/>
           </a:p>
         </p:txBody>
       </p:sp>
@@ -1552,6 +1510,141 @@
                 <a:defRPr/>
               </a:pPr>
               <a:t>16</a:t>
+            </a:fld>
+            <a:endParaRPr lang="en-US"/>
+          </a:p>
+        </p:txBody>
+      </p:sp>
+    </p:spTree>
+    <p:extLst>
+      <p:ext uri="{BB962C8B-B14F-4D97-AF65-F5344CB8AC3E}">
+        <p14:creationId xmlns="" xmlns:p14="http://schemas.microsoft.com/office/powerpoint/2010/main" val="2537211958"/>
+      </p:ext>
+    </p:extLst>
+  </p:cSld>
+  <p:clrMapOvr>
+    <a:masterClrMapping/>
+  </p:clrMapOvr>
+</p:notes>
+</file>
+
+<file path=ppt/notesSlides/notesSlide16.xml><?xml version="1.0" encoding="utf-8"?>
+<p:notes xmlns:a="http://schemas.openxmlformats.org/drawingml/2006/main" xmlns:r="http://schemas.openxmlformats.org/officeDocument/2006/relationships" xmlns:p="http://schemas.openxmlformats.org/presentationml/2006/main">
+  <p:cSld>
+    <p:spTree>
+      <p:nvGrpSpPr>
+        <p:cNvPr id="1" name=""/>
+        <p:cNvGrpSpPr/>
+        <p:nvPr/>
+      </p:nvGrpSpPr>
+      <p:grpSpPr>
+        <a:xfrm>
+          <a:off x="0" y="0"/>
+          <a:ext cx="0" cy="0"/>
+          <a:chOff x="0" y="0"/>
+          <a:chExt cx="0" cy="0"/>
+        </a:xfrm>
+      </p:grpSpPr>
+      <p:sp>
+        <p:nvSpPr>
+          <p:cNvPr id="2" name="幻灯片图像占位符 1"/>
+          <p:cNvSpPr>
+            <a:spLocks noGrp="1" noRot="1" noChangeAspect="1"/>
+          </p:cNvSpPr>
+          <p:nvPr>
+            <p:ph type="sldImg"/>
+          </p:nvPr>
+        </p:nvSpPr>
+        <p:spPr/>
+      </p:sp>
+      <p:sp>
+        <p:nvSpPr>
+          <p:cNvPr id="3" name="备注占位符 2"/>
+          <p:cNvSpPr>
+            <a:spLocks noGrp="1"/>
+          </p:cNvSpPr>
+          <p:nvPr>
+            <p:ph type="body" idx="1"/>
+          </p:nvPr>
+        </p:nvSpPr>
+        <p:spPr/>
+        <p:txBody>
+          <a:bodyPr>
+            <a:normAutofit/>
+          </a:bodyPr>
+          <a:lstStyle/>
+          <a:p>
+            <a:r>
+              <a:rPr lang="en-US" altLang="zh-CN" dirty="0"/>
+              <a:t>LTE</a:t>
+            </a:r>
+            <a:r>
+              <a:rPr lang="zh-CN" altLang="en-US" dirty="0"/>
+              <a:t>系统只是一个通俗的说法</a:t>
+            </a:r>
+            <a:r>
+              <a:rPr lang="en-US" altLang="zh-CN" dirty="0"/>
+              <a:t>,</a:t>
+            </a:r>
+            <a:r>
+              <a:rPr lang="zh-CN" altLang="en-US" dirty="0"/>
+              <a:t>实际上规范的称法是</a:t>
+            </a:r>
+            <a:r>
+              <a:rPr lang="en-US" altLang="zh-CN" dirty="0"/>
+              <a:t>EPS,</a:t>
+            </a:r>
+            <a:r>
+              <a:rPr lang="zh-CN" altLang="en-US" baseline="0" dirty="0"/>
+              <a:t>它由</a:t>
+            </a:r>
+            <a:r>
+              <a:rPr lang="en-US" altLang="zh-CN" baseline="0" dirty="0"/>
+              <a:t>EPC</a:t>
+            </a:r>
+            <a:r>
+              <a:rPr lang="zh-CN" altLang="en-US" baseline="0" dirty="0"/>
+              <a:t>和</a:t>
+            </a:r>
+            <a:r>
+              <a:rPr lang="en-US" altLang="zh-CN" baseline="0" dirty="0"/>
+              <a:t>E-UTRAN</a:t>
+            </a:r>
+            <a:r>
+              <a:rPr lang="zh-CN" altLang="en-US" baseline="0" dirty="0"/>
+              <a:t>组成</a:t>
+            </a:r>
+            <a:r>
+              <a:rPr lang="en-US" altLang="zh-CN" baseline="0" dirty="0"/>
+              <a:t>.</a:t>
+            </a:r>
+          </a:p>
+        </p:txBody>
+      </p:sp>
+      <p:sp>
+        <p:nvSpPr>
+          <p:cNvPr id="4" name="灯片编号占位符 3"/>
+          <p:cNvSpPr>
+            <a:spLocks noGrp="1"/>
+          </p:cNvSpPr>
+          <p:nvPr>
+            <p:ph type="sldNum" sz="quarter" idx="10"/>
+          </p:nvPr>
+        </p:nvSpPr>
+        <p:spPr/>
+        <p:txBody>
+          <a:bodyPr/>
+          <a:lstStyle/>
+          <a:p>
+            <a:pPr>
+              <a:defRPr/>
+            </a:pPr>
+            <a:fld id="{26C2616F-011D-47B3-A2C1-4E16F11993E6}" type="slidenum">
+              <a:rPr lang="en-US" smtClean="0"/>
+              <a:pPr>
+                <a:defRPr/>
+              </a:pPr>
+              <a:t>17</a:t>
             </a:fld>
             <a:endParaRPr lang="en-US"/>
           </a:p>
@@ -1734,7 +1827,7 @@
     </p:spTree>
     <p:extLst>
       <p:ext uri="{BB962C8B-B14F-4D97-AF65-F5344CB8AC3E}">
-        <p14:creationId xmlns:p14="http://schemas.microsoft.com/office/powerpoint/2010/main" xmlns="" val="964776394"/>
+        <p14:creationId xmlns="" xmlns:p14="http://schemas.microsoft.com/office/powerpoint/2010/main" val="964776394"/>
       </p:ext>
     </p:extLst>
   </p:cSld>
@@ -1826,7 +1919,7 @@
     </p:spTree>
     <p:extLst>
       <p:ext uri="{BB962C8B-B14F-4D97-AF65-F5344CB8AC3E}">
-        <p14:creationId xmlns:p14="http://schemas.microsoft.com/office/powerpoint/2010/main" xmlns="" val="3029156377"/>
+        <p14:creationId xmlns="" xmlns:p14="http://schemas.microsoft.com/office/powerpoint/2010/main" val="3029156377"/>
       </p:ext>
     </p:extLst>
   </p:cSld>
@@ -1918,7 +2011,7 @@
     </p:spTree>
     <p:extLst>
       <p:ext uri="{BB962C8B-B14F-4D97-AF65-F5344CB8AC3E}">
-        <p14:creationId xmlns:p14="http://schemas.microsoft.com/office/powerpoint/2010/main" xmlns="" val="1016517152"/>
+        <p14:creationId xmlns="" xmlns:p14="http://schemas.microsoft.com/office/powerpoint/2010/main" val="1016517152"/>
       </p:ext>
     </p:extLst>
   </p:cSld>
@@ -2010,7 +2103,7 @@
     </p:spTree>
     <p:extLst>
       <p:ext uri="{BB962C8B-B14F-4D97-AF65-F5344CB8AC3E}">
-        <p14:creationId xmlns:p14="http://schemas.microsoft.com/office/powerpoint/2010/main" xmlns="" val="3986890417"/>
+        <p14:creationId xmlns="" xmlns:p14="http://schemas.microsoft.com/office/powerpoint/2010/main" val="3986890417"/>
       </p:ext>
     </p:extLst>
   </p:cSld>
@@ -2102,7 +2195,7 @@
     </p:spTree>
     <p:extLst>
       <p:ext uri="{BB962C8B-B14F-4D97-AF65-F5344CB8AC3E}">
-        <p14:creationId xmlns:p14="http://schemas.microsoft.com/office/powerpoint/2010/main" xmlns="" val="392122695"/>
+        <p14:creationId xmlns="" xmlns:p14="http://schemas.microsoft.com/office/powerpoint/2010/main" val="392122695"/>
       </p:ext>
     </p:extLst>
   </p:cSld>
@@ -2194,7 +2287,7 @@
     </p:spTree>
     <p:extLst>
       <p:ext uri="{BB962C8B-B14F-4D97-AF65-F5344CB8AC3E}">
-        <p14:creationId xmlns:p14="http://schemas.microsoft.com/office/powerpoint/2010/main" xmlns="" val="3644203021"/>
+        <p14:creationId xmlns="" xmlns:p14="http://schemas.microsoft.com/office/powerpoint/2010/main" val="3644203021"/>
       </p:ext>
     </p:extLst>
   </p:cSld>
@@ -2286,7 +2379,7 @@
     </p:spTree>
     <p:extLst>
       <p:ext uri="{BB962C8B-B14F-4D97-AF65-F5344CB8AC3E}">
-        <p14:creationId xmlns:p14="http://schemas.microsoft.com/office/powerpoint/2010/main" xmlns="" val="1929220709"/>
+        <p14:creationId xmlns="" xmlns:p14="http://schemas.microsoft.com/office/powerpoint/2010/main" val="1929220709"/>
       </p:ext>
     </p:extLst>
   </p:cSld>
@@ -3045,7 +3138,7 @@
           <a:blip r:embed="rId3">
             <a:extLst>
               <a:ext uri="{28A0092B-C50C-407E-A947-70E740481C1C}">
-                <a14:useLocalDpi xmlns:a14="http://schemas.microsoft.com/office/drawing/2010/main" xmlns="" val="0"/>
+                <a14:useLocalDpi xmlns="" xmlns:a14="http://schemas.microsoft.com/office/drawing/2010/main" val="0"/>
               </a:ext>
             </a:extLst>
           </a:blip>
@@ -7870,11 +7963,7 @@
             </a:pPr>
             <a:r>
               <a:rPr lang="en-GB" sz="1800" dirty="0" smtClean="0"/>
-              <a:t>0</a:t>
-            </a:r>
-            <a:r>
-              <a:rPr lang="en-GB" sz="1800" dirty="0" smtClean="0"/>
-              <a:t>1-</a:t>
+              <a:t>01-</a:t>
             </a:r>
             <a:r>
               <a:rPr lang="en-US" sz="1800" dirty="0" smtClean="0"/>
@@ -8287,7 +8376,7 @@
     </p:spTree>
     <p:extLst>
       <p:ext uri="{BB962C8B-B14F-4D97-AF65-F5344CB8AC3E}">
-        <p14:creationId xmlns:p14="http://schemas.microsoft.com/office/powerpoint/2010/main" xmlns="" val="611371241"/>
+        <p14:creationId xmlns="" xmlns:p14="http://schemas.microsoft.com/office/powerpoint/2010/main" val="611371241"/>
       </p:ext>
     </p:extLst>
   </p:cSld>
@@ -8667,7 +8756,7 @@
     </p:spTree>
     <p:extLst>
       <p:ext uri="{BB962C8B-B14F-4D97-AF65-F5344CB8AC3E}">
-        <p14:creationId xmlns:p14="http://schemas.microsoft.com/office/powerpoint/2010/main" xmlns="" val="2314792977"/>
+        <p14:creationId xmlns="" xmlns:p14="http://schemas.microsoft.com/office/powerpoint/2010/main" val="2314792977"/>
       </p:ext>
     </p:extLst>
   </p:cSld>
@@ -9047,7 +9136,7 @@
     </p:spTree>
     <p:extLst>
       <p:ext uri="{BB962C8B-B14F-4D97-AF65-F5344CB8AC3E}">
-        <p14:creationId xmlns:p14="http://schemas.microsoft.com/office/powerpoint/2010/main" xmlns="" val="1056992415"/>
+        <p14:creationId xmlns="" xmlns:p14="http://schemas.microsoft.com/office/powerpoint/2010/main" val="1056992415"/>
       </p:ext>
     </p:extLst>
   </p:cSld>
@@ -9065,6 +9154,475 @@
 </file>
 
 <file path=ppt/slides/slide13.xml><?xml version="1.0" encoding="utf-8"?>
+<p:sld xmlns:a="http://schemas.openxmlformats.org/drawingml/2006/main" xmlns:r="http://schemas.openxmlformats.org/officeDocument/2006/relationships" xmlns:p="http://schemas.openxmlformats.org/presentationml/2006/main">
+  <p:cSld>
+    <p:spTree>
+      <p:nvGrpSpPr>
+        <p:cNvPr id="1" name=""/>
+        <p:cNvGrpSpPr/>
+        <p:nvPr/>
+      </p:nvGrpSpPr>
+      <p:grpSpPr>
+        <a:xfrm>
+          <a:off x="0" y="0"/>
+          <a:ext cx="0" cy="0"/>
+          <a:chOff x="0" y="0"/>
+          <a:chExt cx="0" cy="0"/>
+        </a:xfrm>
+      </p:grpSpPr>
+      <p:sp>
+        <p:nvSpPr>
+          <p:cNvPr id="2" name="Content Placeholder 1"/>
+          <p:cNvSpPr>
+            <a:spLocks noGrp="1"/>
+          </p:cNvSpPr>
+          <p:nvPr>
+            <p:ph idx="1"/>
+          </p:nvPr>
+        </p:nvSpPr>
+        <p:spPr>
+          <a:xfrm>
+            <a:off x="417144" y="1097956"/>
+            <a:ext cx="8229600" cy="3609693"/>
+          </a:xfrm>
+        </p:spPr>
+        <p:txBody>
+          <a:bodyPr/>
+          <a:lstStyle/>
+          <a:p>
+            <a:pPr marL="0" indent="0" hangingPunct="0">
+              <a:buNone/>
+            </a:pPr>
+            <a:endParaRPr lang="en-US" altLang="zh-CN" sz="1000" dirty="0"/>
+          </a:p>
+          <a:p>
+            <a:pPr marL="0" indent="0" hangingPunct="0">
+              <a:buNone/>
+            </a:pPr>
+            <a:endParaRPr lang="en-US" altLang="zh-CN" sz="1000" dirty="0"/>
+          </a:p>
+          <a:p>
+            <a:pPr marL="0" indent="0" hangingPunct="0">
+              <a:buNone/>
+            </a:pPr>
+            <a:endParaRPr lang="en-US" altLang="zh-CN" sz="1000" dirty="0"/>
+          </a:p>
+          <a:p>
+            <a:pPr marL="0" indent="0" hangingPunct="0">
+              <a:buNone/>
+            </a:pPr>
+            <a:endParaRPr lang="en-US" altLang="zh-CN" sz="1000" dirty="0"/>
+          </a:p>
+          <a:p>
+            <a:pPr marL="0" indent="0" hangingPunct="0">
+              <a:buNone/>
+            </a:pPr>
+            <a:endParaRPr lang="en-US" altLang="zh-CN" sz="1000" dirty="0"/>
+          </a:p>
+          <a:p>
+            <a:pPr marL="0" indent="0" hangingPunct="0">
+              <a:buNone/>
+            </a:pPr>
+            <a:endParaRPr lang="en-US" altLang="zh-CN" sz="1000" dirty="0"/>
+          </a:p>
+          <a:p>
+            <a:pPr marL="0" indent="0" hangingPunct="0">
+              <a:buNone/>
+            </a:pPr>
+            <a:endParaRPr lang="en-US" altLang="zh-CN" sz="1000" dirty="0"/>
+          </a:p>
+          <a:p>
+            <a:pPr marL="0" indent="0" hangingPunct="0">
+              <a:buNone/>
+            </a:pPr>
+            <a:endParaRPr lang="en-US" altLang="zh-CN" sz="1000" dirty="0"/>
+          </a:p>
+          <a:p>
+            <a:pPr marL="0" indent="0" hangingPunct="0">
+              <a:buNone/>
+            </a:pPr>
+            <a:endParaRPr lang="en-US" altLang="zh-CN" sz="1000" dirty="0"/>
+          </a:p>
+          <a:p>
+            <a:pPr marL="0" indent="0" hangingPunct="0">
+              <a:buNone/>
+            </a:pPr>
+            <a:endParaRPr lang="en-US" altLang="zh-CN" sz="1000" dirty="0"/>
+          </a:p>
+          <a:p>
+            <a:pPr marL="0" indent="0" hangingPunct="0">
+              <a:buNone/>
+            </a:pPr>
+            <a:endParaRPr lang="en-US" altLang="zh-CN" sz="1000" dirty="0"/>
+          </a:p>
+          <a:p>
+            <a:pPr marL="0" indent="0" hangingPunct="0">
+              <a:buNone/>
+            </a:pPr>
+            <a:endParaRPr lang="en-US" altLang="zh-CN" sz="1000" dirty="0"/>
+          </a:p>
+          <a:p>
+            <a:pPr marL="0" indent="0" hangingPunct="0">
+              <a:buNone/>
+            </a:pPr>
+            <a:endParaRPr lang="en-US" altLang="zh-CN" sz="1000" dirty="0"/>
+          </a:p>
+          <a:p>
+            <a:pPr marL="0" indent="0" hangingPunct="0">
+              <a:buNone/>
+            </a:pPr>
+            <a:endParaRPr lang="en-US" altLang="zh-CN" sz="1000" dirty="0"/>
+          </a:p>
+          <a:p>
+            <a:pPr hangingPunct="0"/>
+            <a:endParaRPr lang="en-GB" altLang="zh-CN" sz="1000" dirty="0"/>
+          </a:p>
+          <a:p>
+            <a:endParaRPr lang="en-US" sz="1600" dirty="0"/>
+          </a:p>
+        </p:txBody>
+      </p:sp>
+      <p:sp>
+        <p:nvSpPr>
+          <p:cNvPr id="3" name="Title 2"/>
+          <p:cNvSpPr>
+            <a:spLocks noGrp="1"/>
+          </p:cNvSpPr>
+          <p:nvPr>
+            <p:ph type="title"/>
+          </p:nvPr>
+        </p:nvSpPr>
+        <p:spPr/>
+        <p:txBody>
+          <a:bodyPr/>
+          <a:lstStyle/>
+          <a:p>
+            <a:r>
+              <a:rPr lang="zh-CN" altLang="en-US" dirty="0" smtClean="0"/>
+              <a:t>端到端的承载</a:t>
+            </a:r>
+            <a:r>
+              <a:rPr lang="en-US" altLang="zh-CN" dirty="0"/>
+              <a:t/>
+            </a:r>
+            <a:br>
+              <a:rPr lang="en-US" altLang="zh-CN" dirty="0"/>
+            </a:br>
+            <a:r>
+              <a:rPr lang="en-US" altLang="zh-CN" dirty="0"/>
+              <a:t/>
+            </a:r>
+            <a:br>
+              <a:rPr lang="en-US" altLang="zh-CN" dirty="0"/>
+            </a:br>
+            <a:r>
+              <a:rPr lang="en-US" dirty="0"/>
+              <a:t/>
+            </a:r>
+            <a:br>
+              <a:rPr lang="en-US" dirty="0"/>
+            </a:br>
+            <a:r>
+              <a:rPr lang="en-US" dirty="0"/>
+              <a:t/>
+            </a:r>
+            <a:br>
+              <a:rPr lang="en-US" dirty="0"/>
+            </a:br>
+            <a:r>
+              <a:rPr lang="en-US" dirty="0"/>
+              <a:t/>
+            </a:r>
+            <a:br>
+              <a:rPr lang="en-US" dirty="0"/>
+            </a:br>
+            <a:r>
+              <a:rPr lang="en-US" dirty="0"/>
+              <a:t/>
+            </a:r>
+            <a:br>
+              <a:rPr lang="en-US" dirty="0"/>
+            </a:br>
+            <a:r>
+              <a:rPr lang="en-US" dirty="0"/>
+              <a:t/>
+            </a:r>
+            <a:br>
+              <a:rPr lang="en-US" dirty="0"/>
+            </a:br>
+            <a:r>
+              <a:rPr lang="en-US" dirty="0"/>
+              <a:t/>
+            </a:r>
+            <a:br>
+              <a:rPr lang="en-US" dirty="0"/>
+            </a:br>
+            <a:r>
+              <a:rPr lang="en-US" dirty="0"/>
+              <a:t/>
+            </a:r>
+            <a:br>
+              <a:rPr lang="en-US" dirty="0"/>
+            </a:br>
+            <a:r>
+              <a:rPr lang="en-US" dirty="0"/>
+              <a:t/>
+            </a:r>
+            <a:br>
+              <a:rPr lang="en-US" dirty="0"/>
+            </a:br>
+            <a:r>
+              <a:rPr lang="en-US" dirty="0"/>
+              <a:t/>
+            </a:r>
+            <a:br>
+              <a:rPr lang="en-US" dirty="0"/>
+            </a:br>
+            <a:r>
+              <a:rPr lang="en-US" dirty="0"/>
+              <a:t/>
+            </a:r>
+            <a:br>
+              <a:rPr lang="en-US" dirty="0"/>
+            </a:br>
+            <a:endParaRPr lang="en-US" dirty="0"/>
+          </a:p>
+        </p:txBody>
+      </p:sp>
+      <p:sp>
+        <p:nvSpPr>
+          <p:cNvPr id="5" name="Footer Placeholder 4"/>
+          <p:cNvSpPr>
+            <a:spLocks noGrp="1"/>
+          </p:cNvSpPr>
+          <p:nvPr>
+            <p:ph type="ftr" sz="quarter" idx="14"/>
+          </p:nvPr>
+        </p:nvSpPr>
+        <p:spPr/>
+        <p:txBody>
+          <a:bodyPr/>
+          <a:lstStyle/>
+          <a:p>
+            <a:pPr algn="l"/>
+            <a:r>
+              <a:rPr lang="en-US" noProof="0" dirty="0">
+                <a:solidFill>
+                  <a:schemeClr val="bg2"/>
+                </a:solidFill>
+                <a:cs typeface="Arial" charset="0"/>
+              </a:rPr>
+              <a:t>&lt;Change information classification in footer&gt;</a:t>
+            </a:r>
+          </a:p>
+        </p:txBody>
+      </p:sp>
+      <p:sp>
+        <p:nvSpPr>
+          <p:cNvPr id="8194" name="Rectangle 2"/>
+          <p:cNvSpPr>
+            <a:spLocks noChangeArrowheads="1"/>
+          </p:cNvSpPr>
+          <p:nvPr/>
+        </p:nvSpPr>
+        <p:spPr bwMode="auto">
+          <a:xfrm>
+            <a:off x="0" y="0"/>
+            <a:ext cx="9144000" cy="0"/>
+          </a:xfrm>
+          <a:prstGeom prst="rect">
+            <a:avLst/>
+          </a:prstGeom>
+          <a:noFill/>
+          <a:ln w="9525">
+            <a:noFill/>
+            <a:miter lim="800000"/>
+            <a:headEnd/>
+            <a:tailEnd/>
+          </a:ln>
+          <a:effectLst/>
+        </p:spPr>
+        <p:txBody>
+          <a:bodyPr vert="horz" wrap="none" lIns="91440" tIns="45720" rIns="91440" bIns="45720" numCol="1" anchor="ctr" anchorCtr="0" compatLnSpc="1">
+            <a:prstTxWarp prst="textNoShape">
+              <a:avLst/>
+            </a:prstTxWarp>
+            <a:spAutoFit/>
+          </a:bodyPr>
+          <a:lstStyle/>
+          <a:p>
+            <a:endParaRPr lang="zh-CN" altLang="en-US"/>
+          </a:p>
+        </p:txBody>
+      </p:sp>
+      <p:sp>
+        <p:nvSpPr>
+          <p:cNvPr id="4" name="Content Placeholder 3"/>
+          <p:cNvSpPr>
+            <a:spLocks noGrp="1"/>
+          </p:cNvSpPr>
+          <p:nvPr>
+            <p:ph sz="quarter" idx="13"/>
+          </p:nvPr>
+        </p:nvSpPr>
+        <p:spPr/>
+        <p:txBody>
+          <a:bodyPr/>
+          <a:lstStyle/>
+          <a:p>
+            <a:endParaRPr lang="en-US" altLang="zh-CN" dirty="0"/>
+          </a:p>
+          <a:p>
+            <a:endParaRPr lang="zh-CN" altLang="en-US" dirty="0"/>
+          </a:p>
+        </p:txBody>
+      </p:sp>
+      <p:sp>
+        <p:nvSpPr>
+          <p:cNvPr id="10" name="Content Placeholder 1"/>
+          <p:cNvSpPr txBox="1">
+            <a:spLocks/>
+          </p:cNvSpPr>
+          <p:nvPr/>
+        </p:nvSpPr>
+        <p:spPr bwMode="auto">
+          <a:xfrm>
+            <a:off x="417513" y="1089025"/>
+            <a:ext cx="8229600" cy="3306763"/>
+          </a:xfrm>
+          <a:prstGeom prst="rect">
+            <a:avLst/>
+          </a:prstGeom>
+          <a:noFill/>
+          <a:ln w="9525">
+            <a:noFill/>
+            <a:miter lim="800000"/>
+            <a:headEnd/>
+            <a:tailEnd/>
+          </a:ln>
+        </p:spPr>
+        <p:txBody>
+          <a:bodyPr vert="horz" wrap="square" lIns="0" tIns="0" rIns="0" bIns="0" numCol="1" anchor="t" anchorCtr="0" compatLnSpc="1">
+            <a:prstTxWarp prst="textNoShape">
+              <a:avLst/>
+            </a:prstTxWarp>
+          </a:bodyPr>
+          <a:lstStyle/>
+          <a:p>
+            <a:pPr marL="230188" marR="0" lvl="0" indent="-230188" algn="l" defTabSz="457200" rtl="0" eaLnBrk="1" fontAlgn="base" latinLnBrk="0" hangingPunct="1">
+              <a:lnSpc>
+                <a:spcPct val="100000"/>
+              </a:lnSpc>
+              <a:spcBef>
+                <a:spcPct val="0"/>
+              </a:spcBef>
+              <a:spcAft>
+                <a:spcPts val="600"/>
+              </a:spcAft>
+              <a:buClrTx/>
+              <a:buSzTx/>
+              <a:buFont typeface="Arial" charset="0"/>
+              <a:buChar char="•"/>
+              <a:tabLst/>
+              <a:defRPr/>
+            </a:pPr>
+            <a:endParaRPr lang="en-US" sz="1000" dirty="0" smtClean="0">
+              <a:solidFill>
+                <a:schemeClr val="bg2"/>
+              </a:solidFill>
+              <a:latin typeface="+mn-lt"/>
+              <a:ea typeface="ヒラギノ角ゴ Pro W3" charset="0"/>
+              <a:cs typeface="ヒラギノ角ゴ Pro W3" charset="0"/>
+            </a:endParaRPr>
+          </a:p>
+          <a:p>
+            <a:pPr marL="230188" marR="0" lvl="0" indent="-230188" algn="l" defTabSz="457200" rtl="0" eaLnBrk="1" fontAlgn="base" latinLnBrk="0" hangingPunct="1">
+              <a:lnSpc>
+                <a:spcPct val="100000"/>
+              </a:lnSpc>
+              <a:spcBef>
+                <a:spcPct val="0"/>
+              </a:spcBef>
+              <a:spcAft>
+                <a:spcPts val="600"/>
+              </a:spcAft>
+              <a:buClrTx/>
+              <a:buSzTx/>
+              <a:buFont typeface="Arial" charset="0"/>
+              <a:buChar char="•"/>
+              <a:tabLst/>
+              <a:defRPr/>
+            </a:pPr>
+            <a:endParaRPr kumimoji="0" lang="en-US" sz="1600" b="0" i="0" u="none" strike="noStrike" kern="1200" cap="none" spc="0" normalizeH="0" baseline="0" noProof="0" dirty="0">
+              <a:ln>
+                <a:noFill/>
+              </a:ln>
+              <a:solidFill>
+                <a:schemeClr val="bg2"/>
+              </a:solidFill>
+              <a:effectLst/>
+              <a:uLnTx/>
+              <a:uFillTx/>
+              <a:latin typeface="+mn-lt"/>
+              <a:ea typeface="ヒラギノ角ゴ Pro W3" charset="0"/>
+              <a:cs typeface="ヒラギノ角ゴ Pro W3" charset="0"/>
+            </a:endParaRPr>
+          </a:p>
+        </p:txBody>
+      </p:sp>
+      <p:pic>
+        <p:nvPicPr>
+          <p:cNvPr id="6" name="Picture 2"/>
+          <p:cNvPicPr>
+            <a:picLocks noChangeAspect="1" noChangeArrowheads="1"/>
+          </p:cNvPicPr>
+          <p:nvPr/>
+        </p:nvPicPr>
+        <p:blipFill>
+          <a:blip r:embed="rId3"/>
+          <a:srcRect/>
+          <a:stretch>
+            <a:fillRect/>
+          </a:stretch>
+        </p:blipFill>
+        <p:spPr bwMode="auto">
+          <a:xfrm>
+            <a:off x="355409" y="809314"/>
+            <a:ext cx="5434013" cy="2767013"/>
+          </a:xfrm>
+          <a:prstGeom prst="rect">
+            <a:avLst/>
+          </a:prstGeom>
+          <a:noFill/>
+          <a:ln w="9525">
+            <a:noFill/>
+            <a:miter lim="800000"/>
+            <a:headEnd/>
+            <a:tailEnd/>
+          </a:ln>
+        </p:spPr>
+      </p:pic>
+    </p:spTree>
+    <p:extLst>
+      <p:ext uri="{BB962C8B-B14F-4D97-AF65-F5344CB8AC3E}">
+        <p14:creationId xmlns="" xmlns:p14="http://schemas.microsoft.com/office/powerpoint/2010/main" val="1056992415"/>
+      </p:ext>
+    </p:extLst>
+  </p:cSld>
+  <p:clrMapOvr>
+    <a:masterClrMapping/>
+  </p:clrMapOvr>
+  <p:timing>
+    <p:tnLst>
+      <p:par>
+        <p:cTn id="1" dur="indefinite" restart="never" nodeType="tmRoot"/>
+      </p:par>
+    </p:tnLst>
+  </p:timing>
+</p:sld>
+</file>
+
+<file path=ppt/slides/slide14.xml><?xml version="1.0" encoding="utf-8"?>
 <p:sld xmlns:a="http://schemas.openxmlformats.org/drawingml/2006/main" xmlns:r="http://schemas.openxmlformats.org/officeDocument/2006/relationships" xmlns:p="http://schemas.openxmlformats.org/presentationml/2006/main">
   <p:cSld>
     <p:spTree>
@@ -10082,7 +10640,7 @@
     </p:spTree>
     <p:extLst>
       <p:ext uri="{BB962C8B-B14F-4D97-AF65-F5344CB8AC3E}">
-        <p14:creationId xmlns:p14="http://schemas.microsoft.com/office/powerpoint/2010/main" xmlns="" val="1056992415"/>
+        <p14:creationId xmlns="" xmlns:p14="http://schemas.microsoft.com/office/powerpoint/2010/main" val="1056992415"/>
       </p:ext>
     </p:extLst>
   </p:cSld>
@@ -10099,7 +10657,7 @@
 </p:sld>
 </file>
 
-<file path=ppt/slides/slide14.xml><?xml version="1.0" encoding="utf-8"?>
+<file path=ppt/slides/slide15.xml><?xml version="1.0" encoding="utf-8"?>
 <p:sld xmlns:a="http://schemas.openxmlformats.org/drawingml/2006/main" xmlns:r="http://schemas.openxmlformats.org/officeDocument/2006/relationships" xmlns:p="http://schemas.openxmlformats.org/presentationml/2006/main">
   <p:cSld>
     <p:spTree>
@@ -10245,15 +10803,7 @@
           <a:p>
             <a:r>
               <a:rPr lang="zh-CN" altLang="en-US" dirty="0" smtClean="0"/>
-              <a:t>多天线</a:t>
-            </a:r>
-            <a:r>
-              <a:rPr lang="zh-CN" altLang="en-US" dirty="0" smtClean="0"/>
-              <a:t>技</a:t>
-            </a:r>
-            <a:r>
-              <a:rPr lang="zh-CN" altLang="en-US" dirty="0" smtClean="0"/>
-              <a:t>术</a:t>
+              <a:t>多天线技术</a:t>
             </a:r>
             <a:r>
               <a:rPr lang="en-US" altLang="zh-CN" dirty="0"/>
@@ -10462,11 +11012,7 @@
           <a:p>
             <a:r>
               <a:rPr lang="zh-CN" altLang="zh-CN" sz="1600" dirty="0" smtClean="0"/>
-              <a:t>提</a:t>
-            </a:r>
-            <a:r>
-              <a:rPr lang="zh-CN" altLang="zh-CN" sz="1600" dirty="0" smtClean="0"/>
-              <a:t>高信号强度 </a:t>
+              <a:t>提高信号强度 </a:t>
             </a:r>
             <a:r>
               <a:rPr lang="en-US" altLang="zh-CN" sz="1600" dirty="0" smtClean="0"/>
@@ -10474,26 +11020,13 @@
             </a:r>
             <a:r>
               <a:rPr lang="zh-CN" altLang="zh-CN" sz="1600" dirty="0" smtClean="0"/>
-              <a:t>&gt; </a:t>
-            </a:r>
+              <a:t>&gt; 波束赋形</a:t>
+            </a:r>
+          </a:p>
+          <a:p>
             <a:r>
               <a:rPr lang="zh-CN" altLang="zh-CN" sz="1600" dirty="0" smtClean="0"/>
-              <a:t>波束赋</a:t>
-            </a:r>
-            <a:r>
-              <a:rPr lang="zh-CN" altLang="zh-CN" sz="1600" dirty="0" smtClean="0"/>
-              <a:t>形</a:t>
-            </a:r>
-            <a:endParaRPr lang="zh-CN" altLang="zh-CN" sz="1600" dirty="0" smtClean="0"/>
-          </a:p>
-          <a:p>
-            <a:r>
-              <a:rPr lang="zh-CN" altLang="zh-CN" sz="1600" dirty="0" smtClean="0"/>
-              <a:t>增强信号稳定性（对抗衰落</a:t>
-            </a:r>
-            <a:r>
-              <a:rPr lang="zh-CN" altLang="zh-CN" sz="1600" dirty="0" smtClean="0"/>
-              <a:t>）</a:t>
+              <a:t>增强信号稳定性（对抗衰落）</a:t>
             </a:r>
             <a:r>
               <a:rPr lang="en-US" altLang="zh-CN" sz="1600" dirty="0" smtClean="0"/>
@@ -10501,23 +11034,11 @@
             </a:r>
             <a:r>
               <a:rPr lang="zh-CN" altLang="zh-CN" sz="1600" dirty="0" smtClean="0"/>
-              <a:t> </a:t>
-            </a:r>
-            <a:r>
-              <a:rPr lang="zh-CN" altLang="zh-CN" sz="1600" dirty="0" smtClean="0"/>
-              <a:t>分</a:t>
-            </a:r>
-            <a:r>
-              <a:rPr lang="zh-CN" altLang="zh-CN" sz="1600" dirty="0" smtClean="0"/>
-              <a:t>集</a:t>
+              <a:t> 分集</a:t>
             </a:r>
             <a:r>
               <a:rPr lang="en-US" altLang="zh-CN" sz="1600" dirty="0" smtClean="0"/>
-              <a:t> </a:t>
-            </a:r>
-            <a:r>
-              <a:rPr lang="en-US" altLang="zh-CN" sz="1600" dirty="0" smtClean="0"/>
-              <a:t>(</a:t>
+              <a:t> (</a:t>
             </a:r>
             <a:r>
               <a:rPr lang="zh-CN" altLang="en-US" sz="1600" dirty="0" smtClean="0"/>
@@ -10540,15 +11061,7 @@
             </a:r>
             <a:r>
               <a:rPr lang="zh-CN" altLang="zh-CN" sz="1600" dirty="0" smtClean="0"/>
-              <a:t> </a:t>
-            </a:r>
-            <a:r>
-              <a:rPr lang="zh-CN" altLang="zh-CN" sz="1600" dirty="0" smtClean="0"/>
-              <a:t>空间复</a:t>
-            </a:r>
-            <a:r>
-              <a:rPr lang="zh-CN" altLang="zh-CN" sz="1600" dirty="0" smtClean="0"/>
-              <a:t>用</a:t>
+              <a:t> 空间复用</a:t>
             </a:r>
             <a:r>
               <a:rPr lang="en-US" altLang="zh-CN" sz="1600" dirty="0" smtClean="0"/>
@@ -10626,7 +11139,7 @@
     </p:spTree>
     <p:extLst>
       <p:ext uri="{BB962C8B-B14F-4D97-AF65-F5344CB8AC3E}">
-        <p14:creationId xmlns:p14="http://schemas.microsoft.com/office/powerpoint/2010/main" xmlns="" val="1056992415"/>
+        <p14:creationId xmlns="" xmlns:p14="http://schemas.microsoft.com/office/powerpoint/2010/main" val="1056992415"/>
       </p:ext>
     </p:extLst>
   </p:cSld>
@@ -10643,7 +11156,7 @@
 </p:sld>
 </file>
 
-<file path=ppt/slides/slide15.xml><?xml version="1.0" encoding="utf-8"?>
+<file path=ppt/slides/slide16.xml><?xml version="1.0" encoding="utf-8"?>
 <p:sld xmlns:a="http://schemas.openxmlformats.org/drawingml/2006/main" xmlns:r="http://schemas.openxmlformats.org/officeDocument/2006/relationships" xmlns:p="http://schemas.openxmlformats.org/presentationml/2006/main">
   <p:cSld>
     <p:spTree>
@@ -10845,11 +11358,7 @@
             </a:r>
             <a:r>
               <a:rPr lang="zh-CN" altLang="en-US" dirty="0" smtClean="0"/>
-              <a:t>技</a:t>
-            </a:r>
-            <a:r>
-              <a:rPr lang="zh-CN" altLang="en-US" dirty="0" smtClean="0"/>
-              <a:t>术</a:t>
+              <a:t>技术</a:t>
             </a:r>
             <a:r>
               <a:rPr lang="en-US" altLang="zh-CN" dirty="0"/>
@@ -11108,218 +11617,9 @@
     </p:spTree>
     <p:extLst>
       <p:ext uri="{BB962C8B-B14F-4D97-AF65-F5344CB8AC3E}">
-        <p14:creationId xmlns:p14="http://schemas.microsoft.com/office/powerpoint/2010/main" xmlns="" val="1056992415"/>
+        <p14:creationId xmlns="" xmlns:p14="http://schemas.microsoft.com/office/powerpoint/2010/main" val="1056992415"/>
       </p:ext>
     </p:extLst>
-  </p:cSld>
-  <p:clrMapOvr>
-    <a:masterClrMapping/>
-  </p:clrMapOvr>
-  <p:timing>
-    <p:tnLst>
-      <p:par>
-        <p:cTn id="1" dur="indefinite" restart="never" nodeType="tmRoot"/>
-      </p:par>
-    </p:tnLst>
-  </p:timing>
-</p:sld>
-</file>
-
-<file path=ppt/slides/slide16.xml><?xml version="1.0" encoding="utf-8"?>
-<p:sld xmlns:a="http://schemas.openxmlformats.org/drawingml/2006/main" xmlns:r="http://schemas.openxmlformats.org/officeDocument/2006/relationships" xmlns:p="http://schemas.openxmlformats.org/presentationml/2006/main">
-  <p:cSld>
-    <p:spTree>
-      <p:nvGrpSpPr>
-        <p:cNvPr id="1" name=""/>
-        <p:cNvGrpSpPr/>
-        <p:nvPr/>
-      </p:nvGrpSpPr>
-      <p:grpSpPr>
-        <a:xfrm>
-          <a:off x="0" y="0"/>
-          <a:ext cx="0" cy="0"/>
-          <a:chOff x="0" y="0"/>
-          <a:chExt cx="0" cy="0"/>
-        </a:xfrm>
-      </p:grpSpPr>
-      <p:sp>
-        <p:nvSpPr>
-          <p:cNvPr id="2" name="Content Placeholder 1"/>
-          <p:cNvSpPr>
-            <a:spLocks noGrp="1"/>
-          </p:cNvSpPr>
-          <p:nvPr>
-            <p:ph idx="1"/>
-          </p:nvPr>
-        </p:nvSpPr>
-        <p:spPr/>
-        <p:txBody>
-          <a:bodyPr/>
-          <a:lstStyle/>
-          <a:p>
-            <a:r>
-              <a:rPr lang="en-GB" altLang="zh-CN" sz="1000" dirty="0"/>
-              <a:t>EPS	Evolved Packet System (</a:t>
-            </a:r>
-            <a:r>
-              <a:rPr lang="en-US" altLang="zh-CN" sz="1000" dirty="0"/>
-              <a:t>EPS = EPC + E-UTRAN)</a:t>
-            </a:r>
-            <a:endParaRPr lang="en-GB" altLang="zh-CN" sz="1000" dirty="0"/>
-          </a:p>
-          <a:p>
-            <a:r>
-              <a:rPr lang="en-GB" altLang="zh-CN" sz="1000" dirty="0"/>
-              <a:t>EPC	Evolved Packet Core</a:t>
-            </a:r>
-          </a:p>
-          <a:p>
-            <a:r>
-              <a:rPr lang="en-GB" altLang="zh-CN" sz="1000" dirty="0"/>
-              <a:t>E-UTRAN	Evolved UTRAN (UTRAN=Universal Terrestrial Radio Access Network)</a:t>
-            </a:r>
-            <a:r>
-              <a:rPr lang="en-US" altLang="zh-CN" sz="1000" dirty="0"/>
-              <a:t>  </a:t>
-            </a:r>
-            <a:endParaRPr lang="en-US" sz="1000" dirty="0"/>
-          </a:p>
-          <a:p>
-            <a:r>
-              <a:rPr lang="x-none" altLang="zh-CN" sz="1000" dirty="0"/>
-              <a:t>eNB	E-UTRAN NodeB</a:t>
-            </a:r>
-            <a:endParaRPr lang="zh-CN" altLang="zh-CN" sz="1000" dirty="0"/>
-          </a:p>
-          <a:p>
-            <a:r>
-              <a:rPr lang="en-GB" altLang="zh-CN" sz="1000" dirty="0"/>
-              <a:t>P-GW	PDN Gateway (PDN=Packet Data Network)</a:t>
-            </a:r>
-          </a:p>
-          <a:p>
-            <a:r>
-              <a:rPr lang="en-US" altLang="zh-CN" sz="1000" dirty="0"/>
-              <a:t>PCRF          Policy and Charging Rules Function</a:t>
-            </a:r>
-            <a:endParaRPr lang="en-GB" altLang="zh-CN" sz="1000" dirty="0"/>
-          </a:p>
-          <a:p>
-            <a:r>
-              <a:rPr lang="x-none" altLang="zh-CN" sz="1000" dirty="0"/>
-              <a:t>S-GW	Serving GateWay</a:t>
-            </a:r>
-            <a:endParaRPr lang="en-US" altLang="zh-CN" sz="1000" dirty="0"/>
-          </a:p>
-          <a:p>
-            <a:r>
-              <a:rPr lang="en-US" altLang="zh-CN" sz="1000" dirty="0"/>
-              <a:t>SAE            System Architecture Evolution</a:t>
-            </a:r>
-          </a:p>
-          <a:p>
-            <a:r>
-              <a:rPr lang="en-GB" altLang="zh-CN" sz="1000" dirty="0"/>
-              <a:t>MME	Mobility Management Entity</a:t>
-            </a:r>
-            <a:endParaRPr lang="zh-CN" altLang="zh-CN" sz="1000" dirty="0"/>
-          </a:p>
-          <a:p>
-            <a:endParaRPr lang="en-US" sz="1600" dirty="0"/>
-          </a:p>
-          <a:p>
-            <a:endParaRPr lang="en-US" sz="1600" dirty="0"/>
-          </a:p>
-        </p:txBody>
-      </p:sp>
-      <p:sp>
-        <p:nvSpPr>
-          <p:cNvPr id="3" name="Title 2"/>
-          <p:cNvSpPr>
-            <a:spLocks noGrp="1"/>
-          </p:cNvSpPr>
-          <p:nvPr>
-            <p:ph type="title"/>
-          </p:nvPr>
-        </p:nvSpPr>
-        <p:spPr/>
-        <p:txBody>
-          <a:bodyPr/>
-          <a:lstStyle/>
-          <a:p>
-            <a:r>
-              <a:rPr lang="zh-CN" altLang="en-US" dirty="0"/>
-              <a:t>缩略语</a:t>
-            </a:r>
-            <a:r>
-              <a:rPr lang="en-GB" altLang="zh-CN" dirty="0"/>
-              <a:t> </a:t>
-            </a:r>
-            <a:r>
-              <a:rPr lang="en-US" dirty="0"/>
-              <a:t/>
-            </a:r>
-            <a:br>
-              <a:rPr lang="en-US" dirty="0"/>
-            </a:br>
-            <a:endParaRPr lang="en-US" dirty="0"/>
-          </a:p>
-        </p:txBody>
-      </p:sp>
-      <p:sp>
-        <p:nvSpPr>
-          <p:cNvPr id="4" name="Content Placeholder 3"/>
-          <p:cNvSpPr>
-            <a:spLocks noGrp="1"/>
-          </p:cNvSpPr>
-          <p:nvPr>
-            <p:ph sz="quarter" idx="13"/>
-          </p:nvPr>
-        </p:nvSpPr>
-        <p:spPr/>
-        <p:txBody>
-          <a:bodyPr/>
-          <a:lstStyle/>
-          <a:p>
-            <a:endParaRPr lang="en-US"/>
-          </a:p>
-        </p:txBody>
-      </p:sp>
-      <p:sp>
-        <p:nvSpPr>
-          <p:cNvPr id="5" name="Footer Placeholder 4"/>
-          <p:cNvSpPr>
-            <a:spLocks noGrp="1"/>
-          </p:cNvSpPr>
-          <p:nvPr>
-            <p:ph type="ftr" sz="quarter" idx="14"/>
-          </p:nvPr>
-        </p:nvSpPr>
-        <p:spPr/>
-        <p:txBody>
-          <a:bodyPr/>
-          <a:lstStyle/>
-          <a:p>
-            <a:pPr algn="l"/>
-            <a:r>
-              <a:rPr lang="en-US" noProof="0">
-                <a:solidFill>
-                  <a:schemeClr val="bg2"/>
-                </a:solidFill>
-                <a:cs typeface="Arial" charset="0"/>
-              </a:rPr>
-              <a:t>&lt;Change information classification in footer&gt;</a:t>
-            </a:r>
-            <a:endParaRPr lang="en-US" noProof="0" dirty="0">
-              <a:solidFill>
-                <a:schemeClr val="bg2"/>
-              </a:solidFill>
-              <a:cs typeface="Arial" charset="0"/>
-            </a:endParaRPr>
-          </a:p>
-        </p:txBody>
-      </p:sp>
-    </p:spTree>
   </p:cSld>
   <p:clrMapOvr>
     <a:masterClrMapping/>
@@ -11367,19 +11667,74 @@
           <a:lstStyle/>
           <a:p>
             <a:r>
-              <a:rPr lang="en-US" altLang="zh-CN" sz="1000" dirty="0">
-                <a:hlinkClick r:id="rId2"/>
-              </a:rPr>
-              <a:t>http://www.3gpp.org/DynaReport/36-series.htm</a:t>
+              <a:rPr lang="en-GB" altLang="zh-CN" sz="1000" dirty="0"/>
+              <a:t>EPS	Evolved Packet System (</a:t>
+            </a:r>
+            <a:r>
+              <a:rPr lang="en-US" altLang="zh-CN" sz="1000" dirty="0"/>
+              <a:t>EPS = EPC + E-UTRAN)</a:t>
+            </a:r>
+            <a:endParaRPr lang="en-GB" altLang="zh-CN" sz="1000" dirty="0"/>
+          </a:p>
+          <a:p>
+            <a:r>
+              <a:rPr lang="en-GB" altLang="zh-CN" sz="1000" dirty="0"/>
+              <a:t>EPC	Evolved Packet Core</a:t>
+            </a:r>
+          </a:p>
+          <a:p>
+            <a:r>
+              <a:rPr lang="en-GB" altLang="zh-CN" sz="1000" dirty="0"/>
+              <a:t>E-UTRAN	Evolved UTRAN (UTRAN=Universal Terrestrial Radio Access Network)</a:t>
+            </a:r>
+            <a:r>
+              <a:rPr lang="en-US" altLang="zh-CN" sz="1000" dirty="0"/>
+              <a:t>  </a:t>
+            </a:r>
+            <a:endParaRPr lang="en-US" sz="1000" dirty="0"/>
+          </a:p>
+          <a:p>
+            <a:r>
+              <a:rPr lang="x-none" altLang="zh-CN" sz="1000" dirty="0"/>
+              <a:t>eNB	E-UTRAN NodeB</a:t>
+            </a:r>
+            <a:endParaRPr lang="zh-CN" altLang="zh-CN" sz="1000" dirty="0"/>
+          </a:p>
+          <a:p>
+            <a:r>
+              <a:rPr lang="en-GB" altLang="zh-CN" sz="1000" dirty="0"/>
+              <a:t>P-GW	PDN Gateway (PDN=Packet Data Network)</a:t>
+            </a:r>
+          </a:p>
+          <a:p>
+            <a:r>
+              <a:rPr lang="en-US" altLang="zh-CN" sz="1000" dirty="0"/>
+              <a:t>PCRF          Policy and Charging Rules Function</a:t>
+            </a:r>
+            <a:endParaRPr lang="en-GB" altLang="zh-CN" sz="1000" dirty="0"/>
+          </a:p>
+          <a:p>
+            <a:r>
+              <a:rPr lang="x-none" altLang="zh-CN" sz="1000" dirty="0"/>
+              <a:t>S-GW	Serving GateWay</a:t>
             </a:r>
             <a:endParaRPr lang="en-US" altLang="zh-CN" sz="1000" dirty="0"/>
           </a:p>
           <a:p>
             <a:r>
               <a:rPr lang="en-US" altLang="zh-CN" sz="1000" dirty="0"/>
-              <a:t>TS 36.300 Evolved Universal Terrestrial Radio Access (E-UTRA) and Evolved Universal Terrestrial Radio Access Network (E-UTRAN); Overall description; Stage 2 </a:t>
-            </a:r>
-            <a:endParaRPr lang="en-US" sz="800" dirty="0"/>
+              <a:t>SAE            System Architecture Evolution</a:t>
+            </a:r>
+          </a:p>
+          <a:p>
+            <a:r>
+              <a:rPr lang="en-GB" altLang="zh-CN" sz="1000" dirty="0"/>
+              <a:t>MME	Mobility Management Entity</a:t>
+            </a:r>
+            <a:endParaRPr lang="zh-CN" altLang="zh-CN" sz="1000" dirty="0"/>
+          </a:p>
+          <a:p>
+            <a:endParaRPr lang="en-US" sz="1600" dirty="0"/>
           </a:p>
           <a:p>
             <a:endParaRPr lang="en-US" sz="1600" dirty="0"/>
@@ -11403,7 +11758,11 @@
           <a:p>
             <a:r>
               <a:rPr lang="zh-CN" altLang="en-US" dirty="0"/>
-              <a:t>参考文献</a:t>
+              <a:t>缩略语</a:t>
+            </a:r>
+            <a:r>
+              <a:rPr lang="en-GB" altLang="zh-CN" dirty="0"/>
+              <a:t> </a:t>
             </a:r>
             <a:r>
               <a:rPr lang="en-US" dirty="0"/>
@@ -11485,6 +11844,156 @@
 </file>
 
 <file path=ppt/slides/slide18.xml><?xml version="1.0" encoding="utf-8"?>
+<p:sld xmlns:a="http://schemas.openxmlformats.org/drawingml/2006/main" xmlns:r="http://schemas.openxmlformats.org/officeDocument/2006/relationships" xmlns:p="http://schemas.openxmlformats.org/presentationml/2006/main">
+  <p:cSld>
+    <p:spTree>
+      <p:nvGrpSpPr>
+        <p:cNvPr id="1" name=""/>
+        <p:cNvGrpSpPr/>
+        <p:nvPr/>
+      </p:nvGrpSpPr>
+      <p:grpSpPr>
+        <a:xfrm>
+          <a:off x="0" y="0"/>
+          <a:ext cx="0" cy="0"/>
+          <a:chOff x="0" y="0"/>
+          <a:chExt cx="0" cy="0"/>
+        </a:xfrm>
+      </p:grpSpPr>
+      <p:sp>
+        <p:nvSpPr>
+          <p:cNvPr id="2" name="Content Placeholder 1"/>
+          <p:cNvSpPr>
+            <a:spLocks noGrp="1"/>
+          </p:cNvSpPr>
+          <p:nvPr>
+            <p:ph idx="1"/>
+          </p:nvPr>
+        </p:nvSpPr>
+        <p:spPr/>
+        <p:txBody>
+          <a:bodyPr/>
+          <a:lstStyle/>
+          <a:p>
+            <a:r>
+              <a:rPr lang="en-US" altLang="zh-CN" sz="1000" dirty="0">
+                <a:hlinkClick r:id="rId2"/>
+              </a:rPr>
+              <a:t>http://www.3gpp.org/DynaReport/36-series.htm</a:t>
+            </a:r>
+            <a:endParaRPr lang="en-US" altLang="zh-CN" sz="1000" dirty="0"/>
+          </a:p>
+          <a:p>
+            <a:r>
+              <a:rPr lang="en-US" altLang="zh-CN" sz="1000" dirty="0"/>
+              <a:t>TS 36.300 Evolved Universal Terrestrial Radio Access (E-UTRA) and Evolved Universal Terrestrial Radio Access Network (E-UTRAN); Overall description; Stage 2 </a:t>
+            </a:r>
+            <a:endParaRPr lang="en-US" sz="800" dirty="0"/>
+          </a:p>
+          <a:p>
+            <a:endParaRPr lang="en-US" sz="1600" dirty="0"/>
+          </a:p>
+        </p:txBody>
+      </p:sp>
+      <p:sp>
+        <p:nvSpPr>
+          <p:cNvPr id="3" name="Title 2"/>
+          <p:cNvSpPr>
+            <a:spLocks noGrp="1"/>
+          </p:cNvSpPr>
+          <p:nvPr>
+            <p:ph type="title"/>
+          </p:nvPr>
+        </p:nvSpPr>
+        <p:spPr/>
+        <p:txBody>
+          <a:bodyPr/>
+          <a:lstStyle/>
+          <a:p>
+            <a:r>
+              <a:rPr lang="zh-CN" altLang="en-US" dirty="0"/>
+              <a:t>参考文献</a:t>
+            </a:r>
+            <a:r>
+              <a:rPr lang="en-US" dirty="0"/>
+              <a:t/>
+            </a:r>
+            <a:br>
+              <a:rPr lang="en-US" dirty="0"/>
+            </a:br>
+            <a:endParaRPr lang="en-US" dirty="0"/>
+          </a:p>
+        </p:txBody>
+      </p:sp>
+      <p:sp>
+        <p:nvSpPr>
+          <p:cNvPr id="4" name="Content Placeholder 3"/>
+          <p:cNvSpPr>
+            <a:spLocks noGrp="1"/>
+          </p:cNvSpPr>
+          <p:nvPr>
+            <p:ph sz="quarter" idx="13"/>
+          </p:nvPr>
+        </p:nvSpPr>
+        <p:spPr/>
+        <p:txBody>
+          <a:bodyPr/>
+          <a:lstStyle/>
+          <a:p>
+            <a:endParaRPr lang="en-US"/>
+          </a:p>
+        </p:txBody>
+      </p:sp>
+      <p:sp>
+        <p:nvSpPr>
+          <p:cNvPr id="5" name="Footer Placeholder 4"/>
+          <p:cNvSpPr>
+            <a:spLocks noGrp="1"/>
+          </p:cNvSpPr>
+          <p:nvPr>
+            <p:ph type="ftr" sz="quarter" idx="14"/>
+          </p:nvPr>
+        </p:nvSpPr>
+        <p:spPr/>
+        <p:txBody>
+          <a:bodyPr/>
+          <a:lstStyle/>
+          <a:p>
+            <a:pPr algn="l"/>
+            <a:r>
+              <a:rPr lang="en-US" noProof="0">
+                <a:solidFill>
+                  <a:schemeClr val="bg2"/>
+                </a:solidFill>
+                <a:cs typeface="Arial" charset="0"/>
+              </a:rPr>
+              <a:t>&lt;Change information classification in footer&gt;</a:t>
+            </a:r>
+            <a:endParaRPr lang="en-US" noProof="0" dirty="0">
+              <a:solidFill>
+                <a:schemeClr val="bg2"/>
+              </a:solidFill>
+              <a:cs typeface="Arial" charset="0"/>
+            </a:endParaRPr>
+          </a:p>
+        </p:txBody>
+      </p:sp>
+    </p:spTree>
+  </p:cSld>
+  <p:clrMapOvr>
+    <a:masterClrMapping/>
+  </p:clrMapOvr>
+  <p:timing>
+    <p:tnLst>
+      <p:par>
+        <p:cTn id="1" dur="indefinite" restart="never" nodeType="tmRoot"/>
+      </p:par>
+    </p:tnLst>
+  </p:timing>
+</p:sld>
+</file>
+
+<file path=ppt/slides/slide19.xml><?xml version="1.0" encoding="utf-8"?>
 <p:sld xmlns:a="http://schemas.openxmlformats.org/drawingml/2006/main" xmlns:r="http://schemas.openxmlformats.org/officeDocument/2006/relationships" xmlns:p="http://schemas.openxmlformats.org/presentationml/2006/main">
   <p:cSld>
     <p:spTree>
@@ -11549,7 +12058,218 @@
 </p:sld>
 </file>
 
-<file path=ppt/slides/slide19.xml><?xml version="1.0" encoding="utf-8"?>
+<file path=ppt/slides/slide2.xml><?xml version="1.0" encoding="utf-8"?>
+<p:sld xmlns:a="http://schemas.openxmlformats.org/drawingml/2006/main" xmlns:r="http://schemas.openxmlformats.org/officeDocument/2006/relationships" xmlns:p="http://schemas.openxmlformats.org/presentationml/2006/main">
+  <p:cSld>
+    <p:spTree>
+      <p:nvGrpSpPr>
+        <p:cNvPr id="1" name=""/>
+        <p:cNvGrpSpPr/>
+        <p:nvPr/>
+      </p:nvGrpSpPr>
+      <p:grpSpPr>
+        <a:xfrm>
+          <a:off x="0" y="0"/>
+          <a:ext cx="0" cy="0"/>
+          <a:chOff x="0" y="0"/>
+          <a:chExt cx="0" cy="0"/>
+        </a:xfrm>
+      </p:grpSpPr>
+      <p:sp>
+        <p:nvSpPr>
+          <p:cNvPr id="2" name="Content Placeholder 1"/>
+          <p:cNvSpPr>
+            <a:spLocks noGrp="1"/>
+          </p:cNvSpPr>
+          <p:nvPr>
+            <p:ph idx="1"/>
+          </p:nvPr>
+        </p:nvSpPr>
+        <p:spPr/>
+        <p:txBody>
+          <a:bodyPr/>
+          <a:lstStyle/>
+          <a:p>
+            <a:r>
+              <a:rPr lang="en-US" altLang="zh-CN" sz="1600" dirty="0"/>
+              <a:t>LTE</a:t>
+            </a:r>
+            <a:r>
+              <a:rPr lang="zh-CN" altLang="en-US" sz="1600" dirty="0"/>
+              <a:t>概述</a:t>
+            </a:r>
+            <a:endParaRPr lang="en-US" altLang="zh-CN" sz="1600" dirty="0"/>
+          </a:p>
+          <a:p>
+            <a:r>
+              <a:rPr lang="en-US" altLang="zh-CN" sz="1600" dirty="0"/>
+              <a:t>SAE</a:t>
+            </a:r>
+            <a:r>
+              <a:rPr lang="zh-CN" altLang="en-US" sz="1600" dirty="0"/>
+              <a:t>核心网</a:t>
+            </a:r>
+            <a:endParaRPr lang="en-US" altLang="zh-CN" sz="1600" dirty="0"/>
+          </a:p>
+          <a:p>
+            <a:r>
+              <a:rPr lang="en-US" altLang="zh-CN" sz="1600" dirty="0"/>
+              <a:t>LTE</a:t>
+            </a:r>
+            <a:r>
+              <a:rPr lang="zh-CN" altLang="en-US" sz="1600" dirty="0"/>
+              <a:t>无线</a:t>
+            </a:r>
+            <a:r>
+              <a:rPr lang="zh-CN" altLang="en-US" sz="1600" dirty="0" smtClean="0"/>
+              <a:t>网</a:t>
+            </a:r>
+            <a:endParaRPr lang="en-US" altLang="zh-CN" sz="1600" dirty="0" smtClean="0"/>
+          </a:p>
+          <a:p>
+            <a:r>
+              <a:rPr lang="zh-CN" altLang="en-US" sz="1600" dirty="0" smtClean="0"/>
+              <a:t>端到端的承载</a:t>
+            </a:r>
+            <a:endParaRPr lang="en-US" altLang="zh-CN" sz="1600" dirty="0"/>
+          </a:p>
+          <a:p>
+            <a:r>
+              <a:rPr lang="en-US" altLang="zh-CN" sz="1600" dirty="0"/>
+              <a:t>OFDM</a:t>
+            </a:r>
+            <a:r>
+              <a:rPr lang="zh-CN" altLang="en-US" sz="1600" dirty="0"/>
+              <a:t>技术</a:t>
+            </a:r>
+            <a:endParaRPr lang="en-US" altLang="zh-CN" sz="1600" dirty="0"/>
+          </a:p>
+          <a:p>
+            <a:r>
+              <a:rPr lang="zh-CN" altLang="en-US" sz="1600" dirty="0"/>
+              <a:t>多天线技术</a:t>
+            </a:r>
+            <a:endParaRPr lang="en-US" altLang="zh-CN" sz="1600" dirty="0"/>
+          </a:p>
+          <a:p>
+            <a:r>
+              <a:rPr lang="en-US" altLang="zh-CN" sz="1600" dirty="0"/>
+              <a:t>LTE-A</a:t>
+            </a:r>
+            <a:r>
+              <a:rPr lang="zh-CN" altLang="en-US" sz="1600" dirty="0"/>
+              <a:t>概述</a:t>
+            </a:r>
+            <a:endParaRPr lang="en-US" sz="1600" dirty="0"/>
+          </a:p>
+          <a:p>
+            <a:endParaRPr lang="en-US" dirty="0"/>
+          </a:p>
+        </p:txBody>
+      </p:sp>
+      <p:sp>
+        <p:nvSpPr>
+          <p:cNvPr id="3" name="Title 2"/>
+          <p:cNvSpPr>
+            <a:spLocks noGrp="1"/>
+          </p:cNvSpPr>
+          <p:nvPr>
+            <p:ph type="title"/>
+          </p:nvPr>
+        </p:nvSpPr>
+        <p:spPr/>
+        <p:txBody>
+          <a:bodyPr/>
+          <a:lstStyle/>
+          <a:p>
+            <a:r>
+              <a:rPr lang="zh-CN" altLang="en-US" dirty="0"/>
+              <a:t>大纲</a:t>
+            </a:r>
+            <a:r>
+              <a:rPr lang="en-GB" altLang="zh-CN" dirty="0"/>
+              <a:t> </a:t>
+            </a:r>
+            <a:r>
+              <a:rPr lang="en-US" dirty="0"/>
+              <a:t/>
+            </a:r>
+            <a:br>
+              <a:rPr lang="en-US" dirty="0"/>
+            </a:br>
+            <a:endParaRPr lang="en-US" dirty="0"/>
+          </a:p>
+        </p:txBody>
+      </p:sp>
+      <p:sp>
+        <p:nvSpPr>
+          <p:cNvPr id="4" name="Content Placeholder 3"/>
+          <p:cNvSpPr>
+            <a:spLocks noGrp="1"/>
+          </p:cNvSpPr>
+          <p:nvPr>
+            <p:ph sz="quarter" idx="13"/>
+          </p:nvPr>
+        </p:nvSpPr>
+        <p:spPr/>
+        <p:txBody>
+          <a:bodyPr/>
+          <a:lstStyle/>
+          <a:p>
+            <a:endParaRPr lang="en-US"/>
+          </a:p>
+        </p:txBody>
+      </p:sp>
+      <p:sp>
+        <p:nvSpPr>
+          <p:cNvPr id="5" name="Footer Placeholder 4"/>
+          <p:cNvSpPr>
+            <a:spLocks noGrp="1"/>
+          </p:cNvSpPr>
+          <p:nvPr>
+            <p:ph type="ftr" sz="quarter" idx="14"/>
+          </p:nvPr>
+        </p:nvSpPr>
+        <p:spPr/>
+        <p:txBody>
+          <a:bodyPr/>
+          <a:lstStyle/>
+          <a:p>
+            <a:pPr algn="l"/>
+            <a:r>
+              <a:rPr lang="en-US" noProof="0">
+                <a:solidFill>
+                  <a:schemeClr val="bg2"/>
+                </a:solidFill>
+                <a:cs typeface="Arial" charset="0"/>
+              </a:rPr>
+              <a:t>&lt;Change information classification in footer&gt;</a:t>
+            </a:r>
+            <a:endParaRPr lang="en-US" noProof="0" dirty="0">
+              <a:solidFill>
+                <a:schemeClr val="bg2"/>
+              </a:solidFill>
+              <a:cs typeface="Arial" charset="0"/>
+            </a:endParaRPr>
+          </a:p>
+        </p:txBody>
+      </p:sp>
+    </p:spTree>
+  </p:cSld>
+  <p:clrMapOvr>
+    <a:masterClrMapping/>
+  </p:clrMapOvr>
+  <p:timing>
+    <p:tnLst>
+      <p:par>
+        <p:cTn id="1" dur="indefinite" restart="never" nodeType="tmRoot"/>
+      </p:par>
+    </p:tnLst>
+  </p:timing>
+</p:sld>
+</file>
+
+<file path=ppt/slides/slide20.xml><?xml version="1.0" encoding="utf-8"?>
 <p:sld xmlns:a="http://schemas.openxmlformats.org/drawingml/2006/main" xmlns:r="http://schemas.openxmlformats.org/officeDocument/2006/relationships" xmlns:p="http://schemas.openxmlformats.org/presentationml/2006/main" show="0">
   <p:cSld>
     <p:spTree>
@@ -11620,7 +12340,7 @@
           <p:nvPr>
             <p:extLst>
               <p:ext uri="{D42A27DB-BD31-4B8C-83A1-F6EECF244321}">
-                <p14:modId xmlns:p14="http://schemas.microsoft.com/office/powerpoint/2010/main" xmlns="" val="4156476300"/>
+                <p14:modId xmlns="" xmlns:p14="http://schemas.microsoft.com/office/powerpoint/2010/main" val="4156476300"/>
               </p:ext>
             </p:extLst>
           </p:nvPr>
@@ -11639,70 +12359,70 @@
                 <a:gridCol w="640998">
                   <a:extLst>
                     <a:ext uri="{9D8B030D-6E8A-4147-A177-3AD203B41FA5}">
-                      <a16:colId xmlns:a16="http://schemas.microsoft.com/office/drawing/2014/main" xmlns="" val="20000"/>
+                      <a16:colId xmlns="" xmlns:a16="http://schemas.microsoft.com/office/drawing/2014/main" val="20000"/>
                     </a:ext>
                   </a:extLst>
                 </a:gridCol>
                 <a:gridCol w="1769302">
                   <a:extLst>
                     <a:ext uri="{9D8B030D-6E8A-4147-A177-3AD203B41FA5}">
-                      <a16:colId xmlns:a16="http://schemas.microsoft.com/office/drawing/2014/main" xmlns="" val="20001"/>
+                      <a16:colId xmlns="" xmlns:a16="http://schemas.microsoft.com/office/drawing/2014/main" val="20001"/>
                     </a:ext>
                   </a:extLst>
                 </a:gridCol>
                 <a:gridCol w="709301">
                   <a:extLst>
                     <a:ext uri="{9D8B030D-6E8A-4147-A177-3AD203B41FA5}">
-                      <a16:colId xmlns:a16="http://schemas.microsoft.com/office/drawing/2014/main" xmlns="" val="20002"/>
+                      <a16:colId xmlns="" xmlns:a16="http://schemas.microsoft.com/office/drawing/2014/main" val="20002"/>
                     </a:ext>
                   </a:extLst>
                 </a:gridCol>
                 <a:gridCol w="717847">
                   <a:extLst>
                     <a:ext uri="{9D8B030D-6E8A-4147-A177-3AD203B41FA5}">
-                      <a16:colId xmlns:a16="http://schemas.microsoft.com/office/drawing/2014/main" xmlns="" val="20003"/>
+                      <a16:colId xmlns="" xmlns:a16="http://schemas.microsoft.com/office/drawing/2014/main" val="20003"/>
                     </a:ext>
                   </a:extLst>
                 </a:gridCol>
                 <a:gridCol w="777667">
                   <a:extLst>
                     <a:ext uri="{9D8B030D-6E8A-4147-A177-3AD203B41FA5}">
-                      <a16:colId xmlns:a16="http://schemas.microsoft.com/office/drawing/2014/main" xmlns="" val="20004"/>
+                      <a16:colId xmlns="" xmlns:a16="http://schemas.microsoft.com/office/drawing/2014/main" val="20004"/>
                     </a:ext>
                   </a:extLst>
                 </a:gridCol>
                 <a:gridCol w="623763">
                   <a:extLst>
                     <a:ext uri="{9D8B030D-6E8A-4147-A177-3AD203B41FA5}">
-                      <a16:colId xmlns:a16="http://schemas.microsoft.com/office/drawing/2014/main" xmlns="" val="20005"/>
+                      <a16:colId xmlns="" xmlns:a16="http://schemas.microsoft.com/office/drawing/2014/main" val="20005"/>
                     </a:ext>
                   </a:extLst>
                 </a:gridCol>
                 <a:gridCol w="1059759">
                   <a:extLst>
                     <a:ext uri="{9D8B030D-6E8A-4147-A177-3AD203B41FA5}">
-                      <a16:colId xmlns:a16="http://schemas.microsoft.com/office/drawing/2014/main" xmlns="" val="20006"/>
+                      <a16:colId xmlns="" xmlns:a16="http://schemas.microsoft.com/office/drawing/2014/main" val="20006"/>
                     </a:ext>
                   </a:extLst>
                 </a:gridCol>
                 <a:gridCol w="803304">
                   <a:extLst>
                     <a:ext uri="{9D8B030D-6E8A-4147-A177-3AD203B41FA5}">
-                      <a16:colId xmlns:a16="http://schemas.microsoft.com/office/drawing/2014/main" xmlns="" val="20007"/>
+                      <a16:colId xmlns="" xmlns:a16="http://schemas.microsoft.com/office/drawing/2014/main" val="20007"/>
                     </a:ext>
                   </a:extLst>
                 </a:gridCol>
                 <a:gridCol w="846034">
                   <a:extLst>
                     <a:ext uri="{9D8B030D-6E8A-4147-A177-3AD203B41FA5}">
-                      <a16:colId xmlns:a16="http://schemas.microsoft.com/office/drawing/2014/main" xmlns="" val="20008"/>
+                      <a16:colId xmlns="" xmlns:a16="http://schemas.microsoft.com/office/drawing/2014/main" val="20008"/>
                     </a:ext>
                   </a:extLst>
                 </a:gridCol>
                 <a:gridCol w="787746">
                   <a:extLst>
                     <a:ext uri="{9D8B030D-6E8A-4147-A177-3AD203B41FA5}">
-                      <a16:colId xmlns:a16="http://schemas.microsoft.com/office/drawing/2014/main" xmlns="" val="20009"/>
+                      <a16:colId xmlns="" xmlns:a16="http://schemas.microsoft.com/office/drawing/2014/main" val="20009"/>
                     </a:ext>
                   </a:extLst>
                 </a:gridCol>
@@ -11916,7 +12636,7 @@
                 </a:tc>
                 <a:extLst>
                   <a:ext uri="{0D108BD9-81ED-4DB2-BD59-A6C34878D82A}">
-                    <a16:rowId xmlns:a16="http://schemas.microsoft.com/office/drawing/2014/main" xmlns="" val="10000"/>
+                    <a16:rowId xmlns="" xmlns:a16="http://schemas.microsoft.com/office/drawing/2014/main" val="10000"/>
                   </a:ext>
                 </a:extLst>
               </a:tr>
@@ -12129,7 +12849,7 @@
                 </a:tc>
                 <a:extLst>
                   <a:ext uri="{0D108BD9-81ED-4DB2-BD59-A6C34878D82A}">
-                    <a16:rowId xmlns:a16="http://schemas.microsoft.com/office/drawing/2014/main" xmlns="" val="10001"/>
+                    <a16:rowId xmlns="" xmlns:a16="http://schemas.microsoft.com/office/drawing/2014/main" val="10001"/>
                   </a:ext>
                 </a:extLst>
               </a:tr>
@@ -12420,7 +13140,7 @@
                 </a:tc>
                 <a:extLst>
                   <a:ext uri="{0D108BD9-81ED-4DB2-BD59-A6C34878D82A}">
-                    <a16:rowId xmlns:a16="http://schemas.microsoft.com/office/drawing/2014/main" xmlns="" val="10002"/>
+                    <a16:rowId xmlns="" xmlns:a16="http://schemas.microsoft.com/office/drawing/2014/main" val="10002"/>
                   </a:ext>
                 </a:extLst>
               </a:tr>
@@ -12683,7 +13403,7 @@
                 </a:tc>
                 <a:extLst>
                   <a:ext uri="{0D108BD9-81ED-4DB2-BD59-A6C34878D82A}">
-                    <a16:rowId xmlns:a16="http://schemas.microsoft.com/office/drawing/2014/main" xmlns="" val="10003"/>
+                    <a16:rowId xmlns="" xmlns:a16="http://schemas.microsoft.com/office/drawing/2014/main" val="10003"/>
                   </a:ext>
                 </a:extLst>
               </a:tr>
@@ -12996,7 +13716,7 @@
                 </a:tc>
                 <a:extLst>
                   <a:ext uri="{0D108BD9-81ED-4DB2-BD59-A6C34878D82A}">
-                    <a16:rowId xmlns:a16="http://schemas.microsoft.com/office/drawing/2014/main" xmlns="" val="10004"/>
+                    <a16:rowId xmlns="" xmlns:a16="http://schemas.microsoft.com/office/drawing/2014/main" val="10004"/>
                   </a:ext>
                 </a:extLst>
               </a:tr>
@@ -13309,7 +14029,7 @@
                 </a:tc>
                 <a:extLst>
                   <a:ext uri="{0D108BD9-81ED-4DB2-BD59-A6C34878D82A}">
-                    <a16:rowId xmlns:a16="http://schemas.microsoft.com/office/drawing/2014/main" xmlns="" val="10005"/>
+                    <a16:rowId xmlns="" xmlns:a16="http://schemas.microsoft.com/office/drawing/2014/main" val="10005"/>
                   </a:ext>
                 </a:extLst>
               </a:tr>
@@ -13606,7 +14326,7 @@
                 </a:tc>
                 <a:extLst>
                   <a:ext uri="{0D108BD9-81ED-4DB2-BD59-A6C34878D82A}">
-                    <a16:rowId xmlns:a16="http://schemas.microsoft.com/office/drawing/2014/main" xmlns="" val="10006"/>
+                    <a16:rowId xmlns="" xmlns:a16="http://schemas.microsoft.com/office/drawing/2014/main" val="10006"/>
                   </a:ext>
                 </a:extLst>
               </a:tr>
@@ -13918,7 +14638,7 @@
                 </a:tc>
                 <a:extLst>
                   <a:ext uri="{0D108BD9-81ED-4DB2-BD59-A6C34878D82A}">
-                    <a16:rowId xmlns:a16="http://schemas.microsoft.com/office/drawing/2014/main" xmlns="" val="10007"/>
+                    <a16:rowId xmlns="" xmlns:a16="http://schemas.microsoft.com/office/drawing/2014/main" val="10007"/>
                   </a:ext>
                 </a:extLst>
               </a:tr>
@@ -14209,7 +14929,7 @@
                 </a:tc>
                 <a:extLst>
                   <a:ext uri="{0D108BD9-81ED-4DB2-BD59-A6C34878D82A}">
-                    <a16:rowId xmlns:a16="http://schemas.microsoft.com/office/drawing/2014/main" xmlns="" val="10008"/>
+                    <a16:rowId xmlns="" xmlns:a16="http://schemas.microsoft.com/office/drawing/2014/main" val="10008"/>
                   </a:ext>
                 </a:extLst>
               </a:tr>
@@ -14483,7 +15203,7 @@
                 </a:tc>
                 <a:extLst>
                   <a:ext uri="{0D108BD9-81ED-4DB2-BD59-A6C34878D82A}">
-                    <a16:rowId xmlns:a16="http://schemas.microsoft.com/office/drawing/2014/main" xmlns="" val="10009"/>
+                    <a16:rowId xmlns="" xmlns:a16="http://schemas.microsoft.com/office/drawing/2014/main" val="10009"/>
                   </a:ext>
                 </a:extLst>
               </a:tr>
@@ -14757,7 +15477,7 @@
                 </a:tc>
                 <a:extLst>
                   <a:ext uri="{0D108BD9-81ED-4DB2-BD59-A6C34878D82A}">
-                    <a16:rowId xmlns:a16="http://schemas.microsoft.com/office/drawing/2014/main" xmlns="" val="10010"/>
+                    <a16:rowId xmlns="" xmlns:a16="http://schemas.microsoft.com/office/drawing/2014/main" val="10010"/>
                   </a:ext>
                 </a:extLst>
               </a:tr>
@@ -14799,206 +15519,6 @@
     <a:masterClrMapping/>
   </p:clrMapOvr>
   <p:transition/>
-</p:sld>
-</file>
-
-<file path=ppt/slides/slide2.xml><?xml version="1.0" encoding="utf-8"?>
-<p:sld xmlns:a="http://schemas.openxmlformats.org/drawingml/2006/main" xmlns:r="http://schemas.openxmlformats.org/officeDocument/2006/relationships" xmlns:p="http://schemas.openxmlformats.org/presentationml/2006/main">
-  <p:cSld>
-    <p:spTree>
-      <p:nvGrpSpPr>
-        <p:cNvPr id="1" name=""/>
-        <p:cNvGrpSpPr/>
-        <p:nvPr/>
-      </p:nvGrpSpPr>
-      <p:grpSpPr>
-        <a:xfrm>
-          <a:off x="0" y="0"/>
-          <a:ext cx="0" cy="0"/>
-          <a:chOff x="0" y="0"/>
-          <a:chExt cx="0" cy="0"/>
-        </a:xfrm>
-      </p:grpSpPr>
-      <p:sp>
-        <p:nvSpPr>
-          <p:cNvPr id="2" name="Content Placeholder 1"/>
-          <p:cNvSpPr>
-            <a:spLocks noGrp="1"/>
-          </p:cNvSpPr>
-          <p:nvPr>
-            <p:ph idx="1"/>
-          </p:nvPr>
-        </p:nvSpPr>
-        <p:spPr/>
-        <p:txBody>
-          <a:bodyPr/>
-          <a:lstStyle/>
-          <a:p>
-            <a:r>
-              <a:rPr lang="en-US" altLang="zh-CN" sz="1600" dirty="0"/>
-              <a:t>LTE</a:t>
-            </a:r>
-            <a:r>
-              <a:rPr lang="zh-CN" altLang="en-US" sz="1600" dirty="0"/>
-              <a:t>概述</a:t>
-            </a:r>
-            <a:endParaRPr lang="en-US" altLang="zh-CN" sz="1600" dirty="0"/>
-          </a:p>
-          <a:p>
-            <a:r>
-              <a:rPr lang="en-US" altLang="zh-CN" sz="1600" dirty="0"/>
-              <a:t>SAE</a:t>
-            </a:r>
-            <a:r>
-              <a:rPr lang="zh-CN" altLang="en-US" sz="1600" dirty="0"/>
-              <a:t>核心网</a:t>
-            </a:r>
-            <a:endParaRPr lang="en-US" altLang="zh-CN" sz="1600" dirty="0"/>
-          </a:p>
-          <a:p>
-            <a:r>
-              <a:rPr lang="en-US" altLang="zh-CN" sz="1600" dirty="0"/>
-              <a:t>LTE</a:t>
-            </a:r>
-            <a:r>
-              <a:rPr lang="zh-CN" altLang="en-US" sz="1600" dirty="0"/>
-              <a:t>无线网</a:t>
-            </a:r>
-            <a:endParaRPr lang="en-US" altLang="zh-CN" sz="1600" dirty="0"/>
-          </a:p>
-          <a:p>
-            <a:r>
-              <a:rPr lang="en-US" altLang="zh-CN" sz="1600" dirty="0"/>
-              <a:t>OFDM</a:t>
-            </a:r>
-            <a:r>
-              <a:rPr lang="zh-CN" altLang="en-US" sz="1600" dirty="0"/>
-              <a:t>技术</a:t>
-            </a:r>
-            <a:endParaRPr lang="en-US" altLang="zh-CN" sz="1600" dirty="0"/>
-          </a:p>
-          <a:p>
-            <a:r>
-              <a:rPr lang="zh-CN" altLang="en-US" sz="1600" dirty="0"/>
-              <a:t>多天线技术</a:t>
-            </a:r>
-            <a:endParaRPr lang="en-US" altLang="zh-CN" sz="1600" dirty="0"/>
-          </a:p>
-          <a:p>
-            <a:r>
-              <a:rPr lang="en-US" altLang="zh-CN" sz="1600" dirty="0"/>
-              <a:t>LTE-A</a:t>
-            </a:r>
-            <a:r>
-              <a:rPr lang="zh-CN" altLang="en-US" sz="1600" dirty="0"/>
-              <a:t>概述</a:t>
-            </a:r>
-            <a:endParaRPr lang="en-US" sz="1600" dirty="0"/>
-          </a:p>
-          <a:p>
-            <a:endParaRPr lang="en-US" dirty="0"/>
-          </a:p>
-        </p:txBody>
-      </p:sp>
-      <p:sp>
-        <p:nvSpPr>
-          <p:cNvPr id="3" name="Title 2"/>
-          <p:cNvSpPr>
-            <a:spLocks noGrp="1"/>
-          </p:cNvSpPr>
-          <p:nvPr>
-            <p:ph type="title"/>
-          </p:nvPr>
-        </p:nvSpPr>
-        <p:spPr/>
-        <p:txBody>
-          <a:bodyPr/>
-          <a:lstStyle/>
-          <a:p>
-            <a:r>
-              <a:rPr lang="zh-CN" altLang="en-US" dirty="0"/>
-              <a:t>大纲</a:t>
-            </a:r>
-            <a:r>
-              <a:rPr lang="en-GB" altLang="zh-CN" dirty="0"/>
-              <a:t> </a:t>
-            </a:r>
-            <a:r>
-              <a:rPr lang="en-US" dirty="0"/>
-              <a:t/>
-            </a:r>
-            <a:br>
-              <a:rPr lang="en-US" dirty="0"/>
-            </a:br>
-            <a:endParaRPr lang="en-US" dirty="0"/>
-          </a:p>
-        </p:txBody>
-      </p:sp>
-      <p:sp>
-        <p:nvSpPr>
-          <p:cNvPr id="4" name="Content Placeholder 3"/>
-          <p:cNvSpPr>
-            <a:spLocks noGrp="1"/>
-          </p:cNvSpPr>
-          <p:nvPr>
-            <p:ph sz="quarter" idx="13"/>
-          </p:nvPr>
-        </p:nvSpPr>
-        <p:spPr/>
-        <p:txBody>
-          <a:bodyPr/>
-          <a:lstStyle/>
-          <a:p>
-            <a:endParaRPr lang="en-US"/>
-          </a:p>
-        </p:txBody>
-      </p:sp>
-      <p:sp>
-        <p:nvSpPr>
-          <p:cNvPr id="5" name="Footer Placeholder 4"/>
-          <p:cNvSpPr>
-            <a:spLocks noGrp="1"/>
-          </p:cNvSpPr>
-          <p:nvPr>
-            <p:ph type="ftr" sz="quarter" idx="14"/>
-          </p:nvPr>
-        </p:nvSpPr>
-        <p:spPr/>
-        <p:txBody>
-          <a:bodyPr/>
-          <a:lstStyle/>
-          <a:p>
-            <a:pPr algn="l"/>
-            <a:r>
-              <a:rPr lang="en-US" noProof="0">
-                <a:solidFill>
-                  <a:schemeClr val="bg2"/>
-                </a:solidFill>
-                <a:cs typeface="Arial" charset="0"/>
-              </a:rPr>
-              <a:t>&lt;Change information classification in footer&gt;</a:t>
-            </a:r>
-            <a:endParaRPr lang="en-US" noProof="0" dirty="0">
-              <a:solidFill>
-                <a:schemeClr val="bg2"/>
-              </a:solidFill>
-              <a:cs typeface="Arial" charset="0"/>
-            </a:endParaRPr>
-          </a:p>
-        </p:txBody>
-      </p:sp>
-    </p:spTree>
-  </p:cSld>
-  <p:clrMapOvr>
-    <a:masterClrMapping/>
-  </p:clrMapOvr>
-  <p:timing>
-    <p:tnLst>
-      <p:par>
-        <p:cTn id="1" dur="indefinite" restart="never" nodeType="tmRoot"/>
-      </p:par>
-    </p:tnLst>
-  </p:timing>
 </p:sld>
 </file>
 
@@ -15696,7 +16216,7 @@
     </p:spTree>
     <p:extLst>
       <p:ext uri="{BB962C8B-B14F-4D97-AF65-F5344CB8AC3E}">
-        <p14:creationId xmlns:p14="http://schemas.microsoft.com/office/powerpoint/2010/main" xmlns="" val="3393719830"/>
+        <p14:creationId xmlns="" xmlns:p14="http://schemas.microsoft.com/office/powerpoint/2010/main" val="3393719830"/>
       </p:ext>
     </p:extLst>
   </p:cSld>
@@ -16065,7 +16585,7 @@
     </p:spTree>
     <p:extLst>
       <p:ext uri="{BB962C8B-B14F-4D97-AF65-F5344CB8AC3E}">
-        <p14:creationId xmlns:p14="http://schemas.microsoft.com/office/powerpoint/2010/main" xmlns="" val="3505666629"/>
+        <p14:creationId xmlns="" xmlns:p14="http://schemas.microsoft.com/office/powerpoint/2010/main" val="3505666629"/>
       </p:ext>
     </p:extLst>
   </p:cSld>
@@ -16434,7 +16954,7 @@
     </p:spTree>
     <p:extLst>
       <p:ext uri="{BB962C8B-B14F-4D97-AF65-F5344CB8AC3E}">
-        <p14:creationId xmlns:p14="http://schemas.microsoft.com/office/powerpoint/2010/main" xmlns="" val="2980639398"/>
+        <p14:creationId xmlns="" xmlns:p14="http://schemas.microsoft.com/office/powerpoint/2010/main" val="2980639398"/>
       </p:ext>
     </p:extLst>
   </p:cSld>
@@ -16810,7 +17330,7 @@
     </p:spTree>
     <p:extLst>
       <p:ext uri="{BB962C8B-B14F-4D97-AF65-F5344CB8AC3E}">
-        <p14:creationId xmlns:p14="http://schemas.microsoft.com/office/powerpoint/2010/main" xmlns="" val="1333256113"/>
+        <p14:creationId xmlns="" xmlns:p14="http://schemas.microsoft.com/office/powerpoint/2010/main" val="1333256113"/>
       </p:ext>
     </p:extLst>
   </p:cSld>
@@ -17210,7 +17730,7 @@
     </p:spTree>
     <p:extLst>
       <p:ext uri="{BB962C8B-B14F-4D97-AF65-F5344CB8AC3E}">
-        <p14:creationId xmlns:p14="http://schemas.microsoft.com/office/powerpoint/2010/main" xmlns="" val="1711238898"/>
+        <p14:creationId xmlns="" xmlns:p14="http://schemas.microsoft.com/office/powerpoint/2010/main" val="1711238898"/>
       </p:ext>
     </p:extLst>
   </p:cSld>
@@ -17614,7 +18134,7 @@
     </p:spTree>
     <p:extLst>
       <p:ext uri="{BB962C8B-B14F-4D97-AF65-F5344CB8AC3E}">
-        <p14:creationId xmlns:p14="http://schemas.microsoft.com/office/powerpoint/2010/main" xmlns="" val="3103873377"/>
+        <p14:creationId xmlns="" xmlns:p14="http://schemas.microsoft.com/office/powerpoint/2010/main" val="3103873377"/>
       </p:ext>
     </p:extLst>
   </p:cSld>
@@ -17934,7 +18454,7 @@
   <a:extraClrSchemeLst/>
   <a:extLst>
     <a:ext uri="{05A4C25C-085E-4340-85A3-A5531E510DB2}">
-      <thm15:themeFamily xmlns:thm15="http://schemas.microsoft.com/office/thememl/2012/main" xmlns="" name="NET_PPT_Temp_Arial_Macro_Free_v51" id="{8D803308-784A-4915-9600-984AB2AA7C57}" vid="{40DA430F-9525-450C-A1C3-970D65CC2B3B}"/>
+      <thm15:themeFamily xmlns="" xmlns:thm15="http://schemas.microsoft.com/office/thememl/2012/main" name="NET_PPT_Temp_Arial_Macro_Free_v51" id="{8D803308-784A-4915-9600-984AB2AA7C57}" vid="{40DA430F-9525-450C-A1C3-970D65CC2B3B}"/>
     </a:ext>
   </a:extLst>
 </a:theme>
@@ -18243,7 +18763,7 @@
   <a:extraClrSchemeLst/>
   <a:extLst>
     <a:ext uri="{05A4C25C-085E-4340-85A3-A5531E510DB2}">
-      <thm15:themeFamily xmlns:thm15="http://schemas.microsoft.com/office/thememl/2012/main" xmlns="" name="NET_PPT_Temp_Arial_Macro_Free_v51" id="{8D803308-784A-4915-9600-984AB2AA7C57}" vid="{4A425527-96A3-4A84-9E4D-BF967562125A}"/>
+      <thm15:themeFamily xmlns="" xmlns:thm15="http://schemas.microsoft.com/office/thememl/2012/main" name="NET_PPT_Temp_Arial_Macro_Free_v51" id="{8D803308-784A-4915-9600-984AB2AA7C57}" vid="{4A425527-96A3-4A84-9E4D-BF967562125A}"/>
     </a:ext>
   </a:extLst>
 </a:theme>
@@ -18564,7 +19084,7 @@
   <a:extraClrSchemeLst/>
   <a:extLst>
     <a:ext uri="{05A4C25C-085E-4340-85A3-A5531E510DB2}">
-      <thm15:themeFamily xmlns:thm15="http://schemas.microsoft.com/office/thememl/2012/main" xmlns="" name="NET_PPT_Temp_Arial_Macro_Free_v51" id="{8D803308-784A-4915-9600-984AB2AA7C57}" vid="{390ADDEA-1B99-4A1B-B179-A2DD6FC18865}"/>
+      <thm15:themeFamily xmlns="" xmlns:thm15="http://schemas.microsoft.com/office/thememl/2012/main" name="NET_PPT_Temp_Arial_Macro_Free_v51" id="{8D803308-784A-4915-9600-984AB2AA7C57}" vid="{390ADDEA-1B99-4A1B-B179-A2DD6FC18865}"/>
     </a:ext>
   </a:extLst>
 </a:theme>

</xml_diff>